<commit_message>
Katha kann jetzt pushen ;)
</commit_message>
<xml_diff>
--- a/Planungspraesentation-Mitte Juni/Planungspräsentation V. 1.pptx
+++ b/Planungspraesentation-Mitte Juni/Planungspräsentation V. 1.pptx
@@ -4569,14 +4569,14 @@
             <p:ph idx="1"/>
             <p:extLst>
               <p:ext uri="{D42A27DB-BD31-4B8C-83A1-F6EECF244321}">
-                <p14:modId xmlns:p14="http://schemas.microsoft.com/office/powerpoint/2010/main" val="1838411641"/>
+                <p14:modId xmlns:p14="http://schemas.microsoft.com/office/powerpoint/2010/main" val="4119163521"/>
               </p:ext>
             </p:extLst>
           </p:nvPr>
         </p:nvGraphicFramePr>
         <p:xfrm>
           <a:off x="457200" y="1600200"/>
-          <a:ext cx="8229600" cy="4033520"/>
+          <a:ext cx="9014079" cy="3759200"/>
         </p:xfrm>
         <a:graphic>
           <a:graphicData uri="http://schemas.openxmlformats.org/drawingml/2006/table">
@@ -4586,7 +4586,7 @@
               </a:tblPr>
               <a:tblGrid>
                 <a:gridCol w="2057400"/>
-                <a:gridCol w="2057400"/>
+                <a:gridCol w="2841879"/>
                 <a:gridCol w="2057400"/>
                 <a:gridCol w="2057400"/>
               </a:tblGrid>
@@ -4664,7 +4664,7 @@
                     <a:p>
                       <a:r>
                         <a:rPr lang="de-DE" dirty="0" smtClean="0"/>
-                        <a:t>12.07.2015</a:t>
+                        <a:t>Bis 12.07.2015</a:t>
                       </a:r>
                       <a:endParaRPr lang="de-DE" dirty="0"/>
                     </a:p>
@@ -4786,7 +4786,7 @@
                     <a:p>
                       <a:r>
                         <a:rPr lang="de-DE" dirty="0" smtClean="0"/>
-                        <a:t>30.08.2015</a:t>
+                        <a:t>Bis 30.08.2015</a:t>
                       </a:r>
                       <a:endParaRPr lang="de-DE" dirty="0"/>
                     </a:p>
@@ -4889,7 +4889,7 @@
                     <a:p>
                       <a:r>
                         <a:rPr lang="de-DE" dirty="0" smtClean="0"/>
-                        <a:t>02.10.2015</a:t>
+                        <a:t>Bis 02.10.2015</a:t>
                       </a:r>
                       <a:endParaRPr lang="de-DE" dirty="0"/>
                     </a:p>

</xml_diff>